<commit_message>
adds bib files and edits boilerplate text'
</commit_message>
<xml_diff>
--- a/inst/rmd_files/uic_ref.pptx
+++ b/inst/rmd_files/uic_ref.pptx
@@ -211,7 +211,7 @@
           <a:p>
             <a:fld id="{0F9C1CCF-B725-44A7-AA57-5E433BD85C9F}" type="datetimeFigureOut">
               <a:rPr lang="en-US" smtClean="0"/>
-              <a:t>4/5/2019</a:t>
+              <a:t>8/25/2021</a:t>
             </a:fld>
             <a:endParaRPr lang="en-US"/>
           </a:p>
@@ -857,7 +857,7 @@
           <a:p>
             <a:fld id="{241EB5C9-1307-BA42-ABA2-0BC069CD8E7F}" type="datetimeFigureOut">
               <a:rPr lang="en-US" smtClean="0"/>
-              <a:t>4/5/2019</a:t>
+              <a:t>8/25/2021</a:t>
             </a:fld>
             <a:endParaRPr lang="en-US"/>
           </a:p>
@@ -915,6 +915,13 @@
   <p:clrMapOvr>
     <a:masterClrMapping/>
   </p:clrMapOvr>
+  <p:timing>
+    <p:tnLst>
+      <p:par>
+        <p:cTn id="1" dur="indefinite" restart="never" nodeType="tmRoot"/>
+      </p:par>
+    </p:tnLst>
+  </p:timing>
 </p:sldLayout>
 </file>
 
@@ -1027,7 +1034,7 @@
           <a:p>
             <a:fld id="{241EB5C9-1307-BA42-ABA2-0BC069CD8E7F}" type="datetimeFigureOut">
               <a:rPr lang="en-US" smtClean="0"/>
-              <a:t>4/5/2019</a:t>
+              <a:t>8/25/2021</a:t>
             </a:fld>
             <a:endParaRPr lang="en-US"/>
           </a:p>
@@ -1207,7 +1214,7 @@
           <a:p>
             <a:fld id="{241EB5C9-1307-BA42-ABA2-0BC069CD8E7F}" type="datetimeFigureOut">
               <a:rPr lang="en-US" smtClean="0"/>
-              <a:t>4/5/2019</a:t>
+              <a:t>8/25/2021</a:t>
             </a:fld>
             <a:endParaRPr lang="en-US"/>
           </a:p>
@@ -1377,7 +1384,7 @@
           <a:p>
             <a:fld id="{241EB5C9-1307-BA42-ABA2-0BC069CD8E7F}" type="datetimeFigureOut">
               <a:rPr lang="en-US" smtClean="0"/>
-              <a:t>4/5/2019</a:t>
+              <a:t>8/25/2021</a:t>
             </a:fld>
             <a:endParaRPr lang="en-US"/>
           </a:p>
@@ -1435,6 +1442,13 @@
   <p:clrMapOvr>
     <a:masterClrMapping/>
   </p:clrMapOvr>
+  <p:timing>
+    <p:tnLst>
+      <p:par>
+        <p:cTn id="1" dur="indefinite" restart="never" nodeType="tmRoot"/>
+      </p:par>
+    </p:tnLst>
+  </p:timing>
 </p:sldLayout>
 </file>
 
@@ -1480,10 +1494,10 @@
           </a:lstStyle>
           <a:p>
             <a:r>
-              <a:rPr lang="en-US" smtClean="0"/>
+              <a:rPr lang="en-US" dirty="0" smtClean="0"/>
               <a:t>Click to edit Master title style</a:t>
             </a:r>
-            <a:endParaRPr lang="en-US"/>
+            <a:endParaRPr lang="en-US" dirty="0"/>
           </a:p>
         </p:txBody>
       </p:sp>
@@ -1623,7 +1637,7 @@
           <a:p>
             <a:fld id="{241EB5C9-1307-BA42-ABA2-0BC069CD8E7F}" type="datetimeFigureOut">
               <a:rPr lang="en-US" smtClean="0"/>
-              <a:t>4/5/2019</a:t>
+              <a:t>8/25/2021</a:t>
             </a:fld>
             <a:endParaRPr lang="en-US"/>
           </a:p>
@@ -1681,6 +1695,13 @@
   <p:clrMapOvr>
     <a:masterClrMapping/>
   </p:clrMapOvr>
+  <p:timing>
+    <p:tnLst>
+      <p:par>
+        <p:cTn id="1" dur="indefinite" restart="never" nodeType="tmRoot"/>
+      </p:par>
+    </p:tnLst>
+  </p:timing>
 </p:sldLayout>
 </file>
 
@@ -1911,7 +1932,7 @@
           <a:p>
             <a:fld id="{241EB5C9-1307-BA42-ABA2-0BC069CD8E7F}" type="datetimeFigureOut">
               <a:rPr lang="en-US" smtClean="0"/>
-              <a:t>4/5/2019</a:t>
+              <a:t>8/25/2021</a:t>
             </a:fld>
             <a:endParaRPr lang="en-US"/>
           </a:p>
@@ -2333,7 +2354,7 @@
           <a:p>
             <a:fld id="{241EB5C9-1307-BA42-ABA2-0BC069CD8E7F}" type="datetimeFigureOut">
               <a:rPr lang="en-US" smtClean="0"/>
-              <a:t>4/5/2019</a:t>
+              <a:t>8/25/2021</a:t>
             </a:fld>
             <a:endParaRPr lang="en-US"/>
           </a:p>
@@ -2451,7 +2472,7 @@
           <a:p>
             <a:fld id="{241EB5C9-1307-BA42-ABA2-0BC069CD8E7F}" type="datetimeFigureOut">
               <a:rPr lang="en-US" smtClean="0"/>
-              <a:t>4/5/2019</a:t>
+              <a:t>8/25/2021</a:t>
             </a:fld>
             <a:endParaRPr lang="en-US"/>
           </a:p>
@@ -2546,7 +2567,7 @@
           <a:p>
             <a:fld id="{241EB5C9-1307-BA42-ABA2-0BC069CD8E7F}" type="datetimeFigureOut">
               <a:rPr lang="en-US" smtClean="0"/>
-              <a:t>4/5/2019</a:t>
+              <a:t>8/25/2021</a:t>
             </a:fld>
             <a:endParaRPr lang="en-US"/>
           </a:p>
@@ -2823,7 +2844,7 @@
           <a:p>
             <a:fld id="{241EB5C9-1307-BA42-ABA2-0BC069CD8E7F}" type="datetimeFigureOut">
               <a:rPr lang="en-US" smtClean="0"/>
-              <a:t>4/5/2019</a:t>
+              <a:t>8/25/2021</a:t>
             </a:fld>
             <a:endParaRPr lang="en-US"/>
           </a:p>
@@ -3076,7 +3097,7 @@
           <a:p>
             <a:fld id="{241EB5C9-1307-BA42-ABA2-0BC069CD8E7F}" type="datetimeFigureOut">
               <a:rPr lang="en-US" smtClean="0"/>
-              <a:t>4/5/2019</a:t>
+              <a:t>8/25/2021</a:t>
             </a:fld>
             <a:endParaRPr lang="en-US"/>
           </a:p>
@@ -3171,7 +3192,7 @@
         </p:nvSpPr>
         <p:spPr>
           <a:xfrm>
-            <a:off x="457200" y="274638"/>
+            <a:off x="457200" y="907110"/>
             <a:ext cx="8229600" cy="1143000"/>
           </a:xfrm>
           <a:prstGeom prst="rect">
@@ -3185,10 +3206,10 @@
           <a:lstStyle/>
           <a:p>
             <a:r>
-              <a:rPr lang="en-US" smtClean="0"/>
+              <a:rPr lang="en-US" dirty="0" smtClean="0"/>
               <a:t>Click to edit Master title style</a:t>
             </a:r>
-            <a:endParaRPr lang="en-US"/>
+            <a:endParaRPr lang="en-US" dirty="0"/>
           </a:p>
         </p:txBody>
       </p:sp>
@@ -3204,8 +3225,8 @@
         </p:nvSpPr>
         <p:spPr>
           <a:xfrm>
-            <a:off x="457200" y="1600200"/>
-            <a:ext cx="8229600" cy="4525963"/>
+            <a:off x="457200" y="2206487"/>
+            <a:ext cx="8229600" cy="3919676"/>
           </a:xfrm>
           <a:prstGeom prst="rect">
             <a:avLst/>
@@ -3219,38 +3240,38 @@
           <a:p>
             <a:pPr lvl="0"/>
             <a:r>
-              <a:rPr lang="en-US" smtClean="0"/>
+              <a:rPr lang="en-US" dirty="0" smtClean="0"/>
               <a:t>Click to edit Master text styles</a:t>
             </a:r>
           </a:p>
           <a:p>
             <a:pPr lvl="1"/>
             <a:r>
-              <a:rPr lang="en-US" smtClean="0"/>
+              <a:rPr lang="en-US" dirty="0" smtClean="0"/>
               <a:t>Second level</a:t>
             </a:r>
           </a:p>
           <a:p>
             <a:pPr lvl="2"/>
             <a:r>
-              <a:rPr lang="en-US" smtClean="0"/>
+              <a:rPr lang="en-US" dirty="0" smtClean="0"/>
               <a:t>Third level</a:t>
             </a:r>
           </a:p>
           <a:p>
             <a:pPr lvl="3"/>
             <a:r>
-              <a:rPr lang="en-US" smtClean="0"/>
+              <a:rPr lang="en-US" dirty="0" smtClean="0"/>
               <a:t>Fourth level</a:t>
             </a:r>
           </a:p>
           <a:p>
             <a:pPr lvl="4"/>
             <a:r>
-              <a:rPr lang="en-US" smtClean="0"/>
+              <a:rPr lang="en-US" dirty="0" smtClean="0"/>
               <a:t>Fifth level</a:t>
             </a:r>
-            <a:endParaRPr lang="en-US"/>
+            <a:endParaRPr lang="en-US" dirty="0"/>
           </a:p>
         </p:txBody>
       </p:sp>
@@ -3289,7 +3310,7 @@
           <a:p>
             <a:fld id="{241EB5C9-1307-BA42-ABA2-0BC069CD8E7F}" type="datetimeFigureOut">
               <a:rPr lang="en-US" smtClean="0"/>
-              <a:t>4/5/2019</a:t>
+              <a:t>8/25/2021</a:t>
             </a:fld>
             <a:endParaRPr lang="en-US"/>
           </a:p>
@@ -3373,6 +3394,36 @@
           </a:p>
         </p:txBody>
       </p:sp>
+      <p:pic>
+        <p:nvPicPr>
+          <p:cNvPr id="7" name="Picture 6"/>
+          <p:cNvPicPr>
+            <a:picLocks noChangeAspect="1"/>
+          </p:cNvPicPr>
+          <p:nvPr userDrawn="1"/>
+        </p:nvPicPr>
+        <p:blipFill>
+          <a:blip r:embed="rId13">
+            <a:extLst>
+              <a:ext uri="{28A0092B-C50C-407E-A947-70E740481C1C}">
+                <a14:useLocalDpi xmlns:a14="http://schemas.microsoft.com/office/drawing/2010/main" val="0"/>
+              </a:ext>
+            </a:extLst>
+          </a:blip>
+          <a:stretch>
+            <a:fillRect/>
+          </a:stretch>
+        </p:blipFill>
+        <p:spPr>
+          <a:xfrm>
+            <a:off x="180477" y="190096"/>
+            <a:ext cx="2984757" cy="594457"/>
+          </a:xfrm>
+          <a:prstGeom prst="rect">
+            <a:avLst/>
+          </a:prstGeom>
+        </p:spPr>
+      </p:pic>
     </p:spTree>
     <p:extLst>
       <p:ext uri="{BB962C8B-B14F-4D97-AF65-F5344CB8AC3E}">
@@ -3394,6 +3445,13 @@
     <p:sldLayoutId id="2147483658" r:id="rId10"/>
     <p:sldLayoutId id="2147483659" r:id="rId11"/>
   </p:sldLayoutIdLst>
+  <p:timing>
+    <p:tnLst>
+      <p:par>
+        <p:cTn id="1" dur="indefinite" restart="never" nodeType="tmRoot"/>
+      </p:par>
+    </p:tnLst>
+  </p:timing>
   <p:txStyles>
     <p:titleStyle>
       <a:lvl1pPr algn="ctr" defTabSz="457200" rtl="0" eaLnBrk="1" latinLnBrk="0" hangingPunct="1">
@@ -3405,7 +3463,7 @@
           <a:solidFill>
             <a:schemeClr val="tx1"/>
           </a:solidFill>
-          <a:latin typeface="+mj-lt"/>
+          <a:latin typeface="HelveticaNeueforSAS" panose="020B0604020202020204" pitchFamily="34" charset="0"/>
           <a:ea typeface="+mj-ea"/>
           <a:cs typeface="+mj-cs"/>
         </a:defRPr>
@@ -3422,7 +3480,7 @@
           <a:solidFill>
             <a:schemeClr val="tx1"/>
           </a:solidFill>
-          <a:latin typeface="+mn-lt"/>
+          <a:latin typeface="HelveticaNeueforSAS" panose="020B0604020202020204" pitchFamily="34" charset="0"/>
           <a:ea typeface="+mn-ea"/>
           <a:cs typeface="+mn-cs"/>
         </a:defRPr>
@@ -3437,7 +3495,7 @@
           <a:solidFill>
             <a:schemeClr val="tx1"/>
           </a:solidFill>
-          <a:latin typeface="+mn-lt"/>
+          <a:latin typeface="HelveticaNeueforSAS" panose="020B0604020202020204" pitchFamily="34" charset="0"/>
           <a:ea typeface="+mn-ea"/>
           <a:cs typeface="+mn-cs"/>
         </a:defRPr>
@@ -3452,7 +3510,7 @@
           <a:solidFill>
             <a:schemeClr val="tx1"/>
           </a:solidFill>
-          <a:latin typeface="+mn-lt"/>
+          <a:latin typeface="HelveticaNeueforSAS" panose="020B0604020202020204" pitchFamily="34" charset="0"/>
           <a:ea typeface="+mn-ea"/>
           <a:cs typeface="+mn-cs"/>
         </a:defRPr>
@@ -3467,7 +3525,7 @@
           <a:solidFill>
             <a:schemeClr val="tx1"/>
           </a:solidFill>
-          <a:latin typeface="+mn-lt"/>
+          <a:latin typeface="HelveticaNeueforSAS" panose="020B0604020202020204" pitchFamily="34" charset="0"/>
           <a:ea typeface="+mn-ea"/>
           <a:cs typeface="+mn-cs"/>
         </a:defRPr>
@@ -3482,7 +3540,7 @@
           <a:solidFill>
             <a:schemeClr val="tx1"/>
           </a:solidFill>
-          <a:latin typeface="+mn-lt"/>
+          <a:latin typeface="HelveticaNeueforSAS" panose="020B0604020202020204" pitchFamily="34" charset="0"/>
           <a:ea typeface="+mn-ea"/>
           <a:cs typeface="+mn-cs"/>
         </a:defRPr>
@@ -3710,6 +3768,29 @@
           </a:p>
         </p:txBody>
       </p:sp>
+      <p:sp>
+        <p:nvSpPr>
+          <p:cNvPr id="4" name="Slide Number Placeholder 3"/>
+          <p:cNvSpPr>
+            <a:spLocks noGrp="1"/>
+          </p:cNvSpPr>
+          <p:nvPr>
+            <p:ph type="sldNum" sz="quarter" idx="12"/>
+          </p:nvPr>
+        </p:nvSpPr>
+        <p:spPr/>
+        <p:txBody>
+          <a:bodyPr/>
+          <a:lstStyle/>
+          <a:p>
+            <a:fld id="{C5EF2332-01BF-834F-8236-50238282D533}" type="slidenum">
+              <a:rPr lang="en-US" smtClean="0"/>
+              <a:t>1</a:t>
+            </a:fld>
+            <a:endParaRPr lang="en-US"/>
+          </a:p>
+        </p:txBody>
+      </p:sp>
     </p:spTree>
     <p:extLst>
       <p:ext uri="{BB962C8B-B14F-4D97-AF65-F5344CB8AC3E}">
@@ -3720,6 +3801,13 @@
   <p:clrMapOvr>
     <a:masterClrMapping/>
   </p:clrMapOvr>
+  <p:timing>
+    <p:tnLst>
+      <p:par>
+        <p:cTn id="1" dur="indefinite" restart="never" nodeType="tmRoot"/>
+      </p:par>
+    </p:tnLst>
+  </p:timing>
 </p:sld>
 </file>
 

</xml_diff>